<commit_message>
Removed the System.out that said shit.
</commit_message>
<xml_diff>
--- a/JsonConverter/target/classes/OutputFolder/test.pptx
+++ b/JsonConverter/target/classes/OutputFolder/test.pptx
@@ -2604,8 +2604,8 @@
         </p:nvSpPr>
         <p:spPr>
           <a:xfrm>
-            <a:off x="0" y="0"/>
-            <a:ext cx="0" cy="0"/>
+            <a:off x="457200" y="1600200"/>
+            <a:ext cx="8229600" cy="4525963"/>
           </a:xfrm>
           <a:prstGeom prst="rect">
             <a:avLst/>

</xml_diff>